<commit_message>
Update: fix term wrong expression in slides
</commit_message>
<xml_diff>
--- a/Flowchart_of_code.pptx
+++ b/Flowchart_of_code.pptx
@@ -107,6 +107,11 @@
       </a:defRPr>
     </a:lvl9pPr>
   </p:defaultTextStyle>
+  <p:extLst>
+    <p:ext uri="{EFAFB233-063F-42B5-8137-9DF3F51BA10A}">
+      <p15:sldGuideLst xmlns:p15="http://schemas.microsoft.com/office/powerpoint/2012/main"/>
+    </p:ext>
+  </p:extLst>
 </p:presentation>
 </file>
 
@@ -257,7 +262,7 @@
           <a:p>
             <a:fld id="{42C7EC7B-5598-4D97-B536-56CBB2234584}" type="datetimeFigureOut">
               <a:rPr lang="zh-CN" altLang="en-US" smtClean="0"/>
-              <a:t>2021/3/14</a:t>
+              <a:t>2021/3/16</a:t>
             </a:fld>
             <a:endParaRPr lang="zh-CN" altLang="en-US"/>
           </a:p>
@@ -455,7 +460,7 @@
           <a:p>
             <a:fld id="{42C7EC7B-5598-4D97-B536-56CBB2234584}" type="datetimeFigureOut">
               <a:rPr lang="zh-CN" altLang="en-US" smtClean="0"/>
-              <a:t>2021/3/14</a:t>
+              <a:t>2021/3/16</a:t>
             </a:fld>
             <a:endParaRPr lang="zh-CN" altLang="en-US"/>
           </a:p>
@@ -663,7 +668,7 @@
           <a:p>
             <a:fld id="{42C7EC7B-5598-4D97-B536-56CBB2234584}" type="datetimeFigureOut">
               <a:rPr lang="zh-CN" altLang="en-US" smtClean="0"/>
-              <a:t>2021/3/14</a:t>
+              <a:t>2021/3/16</a:t>
             </a:fld>
             <a:endParaRPr lang="zh-CN" altLang="en-US"/>
           </a:p>
@@ -861,7 +866,7 @@
           <a:p>
             <a:fld id="{42C7EC7B-5598-4D97-B536-56CBB2234584}" type="datetimeFigureOut">
               <a:rPr lang="zh-CN" altLang="en-US" smtClean="0"/>
-              <a:t>2021/3/14</a:t>
+              <a:t>2021/3/16</a:t>
             </a:fld>
             <a:endParaRPr lang="zh-CN" altLang="en-US"/>
           </a:p>
@@ -1136,7 +1141,7 @@
           <a:p>
             <a:fld id="{42C7EC7B-5598-4D97-B536-56CBB2234584}" type="datetimeFigureOut">
               <a:rPr lang="zh-CN" altLang="en-US" smtClean="0"/>
-              <a:t>2021/3/14</a:t>
+              <a:t>2021/3/16</a:t>
             </a:fld>
             <a:endParaRPr lang="zh-CN" altLang="en-US"/>
           </a:p>
@@ -1401,7 +1406,7 @@
           <a:p>
             <a:fld id="{42C7EC7B-5598-4D97-B536-56CBB2234584}" type="datetimeFigureOut">
               <a:rPr lang="zh-CN" altLang="en-US" smtClean="0"/>
-              <a:t>2021/3/14</a:t>
+              <a:t>2021/3/16</a:t>
             </a:fld>
             <a:endParaRPr lang="zh-CN" altLang="en-US"/>
           </a:p>
@@ -1813,7 +1818,7 @@
           <a:p>
             <a:fld id="{42C7EC7B-5598-4D97-B536-56CBB2234584}" type="datetimeFigureOut">
               <a:rPr lang="zh-CN" altLang="en-US" smtClean="0"/>
-              <a:t>2021/3/14</a:t>
+              <a:t>2021/3/16</a:t>
             </a:fld>
             <a:endParaRPr lang="zh-CN" altLang="en-US"/>
           </a:p>
@@ -1954,7 +1959,7 @@
           <a:p>
             <a:fld id="{42C7EC7B-5598-4D97-B536-56CBB2234584}" type="datetimeFigureOut">
               <a:rPr lang="zh-CN" altLang="en-US" smtClean="0"/>
-              <a:t>2021/3/14</a:t>
+              <a:t>2021/3/16</a:t>
             </a:fld>
             <a:endParaRPr lang="zh-CN" altLang="en-US"/>
           </a:p>
@@ -2067,7 +2072,7 @@
           <a:p>
             <a:fld id="{42C7EC7B-5598-4D97-B536-56CBB2234584}" type="datetimeFigureOut">
               <a:rPr lang="zh-CN" altLang="en-US" smtClean="0"/>
-              <a:t>2021/3/14</a:t>
+              <a:t>2021/3/16</a:t>
             </a:fld>
             <a:endParaRPr lang="zh-CN" altLang="en-US"/>
           </a:p>
@@ -2378,7 +2383,7 @@
           <a:p>
             <a:fld id="{42C7EC7B-5598-4D97-B536-56CBB2234584}" type="datetimeFigureOut">
               <a:rPr lang="zh-CN" altLang="en-US" smtClean="0"/>
-              <a:t>2021/3/14</a:t>
+              <a:t>2021/3/16</a:t>
             </a:fld>
             <a:endParaRPr lang="zh-CN" altLang="en-US"/>
           </a:p>
@@ -2666,7 +2671,7 @@
           <a:p>
             <a:fld id="{42C7EC7B-5598-4D97-B536-56CBB2234584}" type="datetimeFigureOut">
               <a:rPr lang="zh-CN" altLang="en-US" smtClean="0"/>
-              <a:t>2021/3/14</a:t>
+              <a:t>2021/3/16</a:t>
             </a:fld>
             <a:endParaRPr lang="zh-CN" altLang="en-US"/>
           </a:p>
@@ -2907,7 +2912,7 @@
           <a:p>
             <a:fld id="{42C7EC7B-5598-4D97-B536-56CBB2234584}" type="datetimeFigureOut">
               <a:rPr lang="zh-CN" altLang="en-US" smtClean="0"/>
-              <a:t>2021/3/14</a:t>
+              <a:t>2021/3/16</a:t>
             </a:fld>
             <a:endParaRPr lang="zh-CN" altLang="en-US"/>
           </a:p>
@@ -4541,8 +4546,8 @@
         </p:nvSpPr>
         <p:spPr>
           <a:xfrm>
-            <a:off x="9467730" y="229399"/>
-            <a:ext cx="2637260" cy="2462213"/>
+            <a:off x="9317495" y="298902"/>
+            <a:ext cx="2874505" cy="2246769"/>
           </a:xfrm>
           <a:prstGeom prst="rect">
             <a:avLst/>
@@ -4656,12 +4661,16 @@
           </a:p>
           <a:p>
             <a:r>
+              <a:rPr lang="en-US" altLang="zh-CN" sz="1400" b="1" dirty="0"/>
+              <a:t>Prob(</a:t>
+            </a:r>
+            <a:r>
               <a:rPr lang="en-US" altLang="zh-CN" sz="1400" b="1" dirty="0" err="1"/>
-              <a:t>Prob_D</a:t>
+              <a:t>mi|mi</a:t>
             </a:r>
             <a:r>
               <a:rPr lang="en-US" altLang="zh-CN" sz="1400" b="1" dirty="0"/>
-              <a:t>:</a:t>
+              <a:t>):</a:t>
             </a:r>
             <a:r>
               <a:rPr lang="zh-CN" altLang="en-US" sz="1400" dirty="0"/>
@@ -4669,17 +4678,7 @@
             </a:r>
             <a:r>
               <a:rPr lang="en-US" altLang="zh-CN" sz="1400" dirty="0"/>
-              <a:t>P(1|1)</a:t>
-            </a:r>
-          </a:p>
-          <a:p>
-            <a:r>
-              <a:rPr lang="en-US" altLang="zh-CN" sz="1400" b="1" dirty="0" err="1"/>
-              <a:t>Prob_M</a:t>
-            </a:r>
-            <a:r>
-              <a:rPr lang="en-US" altLang="zh-CN" sz="1400" dirty="0"/>
-              <a:t>: P(1|0)</a:t>
+              <a:t>mi correctly detected</a:t>
             </a:r>
           </a:p>
           <a:p>
@@ -5468,8 +5467,8 @@
         </p:nvSpPr>
         <p:spPr>
           <a:xfrm>
-            <a:off x="5116353" y="5814301"/>
-            <a:ext cx="1635763" cy="307777"/>
+            <a:off x="4808428" y="5838197"/>
+            <a:ext cx="2575143" cy="307777"/>
           </a:xfrm>
           <a:prstGeom prst="rect">
             <a:avLst/>
@@ -5496,16 +5495,24 @@
           </a:lstStyle>
           <a:p>
             <a:r>
+              <a:rPr lang="en-US" altLang="zh-CN" b="1" dirty="0"/>
+              <a:t>Prob(</a:t>
+            </a:r>
+            <a:r>
               <a:rPr lang="en-US" altLang="zh-CN" b="1" dirty="0" err="1"/>
-              <a:t>Prob_D</a:t>
+              <a:t>m_i|m_i</a:t>
             </a:r>
             <a:r>
               <a:rPr lang="en-US" altLang="zh-CN" b="1" dirty="0"/>
-              <a:t>/</a:t>
+              <a:t>) /Prob(</a:t>
             </a:r>
             <a:r>
               <a:rPr lang="en-US" altLang="zh-CN" b="1" dirty="0" err="1"/>
-              <a:t>Prob_M</a:t>
+              <a:t>m_j|m_i</a:t>
+            </a:r>
+            <a:r>
+              <a:rPr lang="en-US" altLang="zh-CN" b="1" dirty="0"/>
+              <a:t>)</a:t>
             </a:r>
             <a:endParaRPr lang="zh-CN" altLang="en-US" b="1" dirty="0"/>
           </a:p>

</xml_diff>